<commit_message>
[Host] Added <MainMenu> and <MainMenuView>
</commit_message>
<xml_diff>
--- a/TTT.Host/Arch.pptx
+++ b/TTT.Host/Arch.pptx
@@ -6,6 +6,7 @@
   </p:sldMasterIdLst>
   <p:sldIdLst>
     <p:sldId id="256" r:id="rId2"/>
+    <p:sldId id="257" r:id="rId3"/>
   </p:sldIdLst>
   <p:sldSz cx="12192000" cy="6858000"/>
   <p:notesSz cx="6858000" cy="9144000"/>
@@ -104,6 +105,11 @@
       </a:defRPr>
     </a:lvl9pPr>
   </p:defaultTextStyle>
+  <p:extLst>
+    <p:ext uri="{EFAFB233-063F-42B5-8137-9DF3F51BA10A}">
+      <p15:sldGuideLst xmlns:p15="http://schemas.microsoft.com/office/powerpoint/2012/main"/>
+    </p:ext>
+  </p:extLst>
 </p:presentation>
 </file>
 
@@ -256,7 +262,7 @@
           <a:p>
             <a:fld id="{8F605EE6-647E-41E2-978E-F926EDC8EAD0}" type="datetimeFigureOut">
               <a:rPr lang="en-IE" smtClean="0"/>
-              <a:t>23/04/2020</a:t>
+              <a:t>27/04/2020</a:t>
             </a:fld>
             <a:endParaRPr lang="en-IE"/>
           </a:p>
@@ -456,7 +462,7 @@
           <a:p>
             <a:fld id="{8F605EE6-647E-41E2-978E-F926EDC8EAD0}" type="datetimeFigureOut">
               <a:rPr lang="en-IE" smtClean="0"/>
-              <a:t>23/04/2020</a:t>
+              <a:t>27/04/2020</a:t>
             </a:fld>
             <a:endParaRPr lang="en-IE"/>
           </a:p>
@@ -666,7 +672,7 @@
           <a:p>
             <a:fld id="{8F605EE6-647E-41E2-978E-F926EDC8EAD0}" type="datetimeFigureOut">
               <a:rPr lang="en-IE" smtClean="0"/>
-              <a:t>23/04/2020</a:t>
+              <a:t>27/04/2020</a:t>
             </a:fld>
             <a:endParaRPr lang="en-IE"/>
           </a:p>
@@ -866,7 +872,7 @@
           <a:p>
             <a:fld id="{8F605EE6-647E-41E2-978E-F926EDC8EAD0}" type="datetimeFigureOut">
               <a:rPr lang="en-IE" smtClean="0"/>
-              <a:t>23/04/2020</a:t>
+              <a:t>27/04/2020</a:t>
             </a:fld>
             <a:endParaRPr lang="en-IE"/>
           </a:p>
@@ -1142,7 +1148,7 @@
           <a:p>
             <a:fld id="{8F605EE6-647E-41E2-978E-F926EDC8EAD0}" type="datetimeFigureOut">
               <a:rPr lang="en-IE" smtClean="0"/>
-              <a:t>23/04/2020</a:t>
+              <a:t>27/04/2020</a:t>
             </a:fld>
             <a:endParaRPr lang="en-IE"/>
           </a:p>
@@ -1410,7 +1416,7 @@
           <a:p>
             <a:fld id="{8F605EE6-647E-41E2-978E-F926EDC8EAD0}" type="datetimeFigureOut">
               <a:rPr lang="en-IE" smtClean="0"/>
-              <a:t>23/04/2020</a:t>
+              <a:t>27/04/2020</a:t>
             </a:fld>
             <a:endParaRPr lang="en-IE"/>
           </a:p>
@@ -1825,7 +1831,7 @@
           <a:p>
             <a:fld id="{8F605EE6-647E-41E2-978E-F926EDC8EAD0}" type="datetimeFigureOut">
               <a:rPr lang="en-IE" smtClean="0"/>
-              <a:t>23/04/2020</a:t>
+              <a:t>27/04/2020</a:t>
             </a:fld>
             <a:endParaRPr lang="en-IE"/>
           </a:p>
@@ -1967,7 +1973,7 @@
           <a:p>
             <a:fld id="{8F605EE6-647E-41E2-978E-F926EDC8EAD0}" type="datetimeFigureOut">
               <a:rPr lang="en-IE" smtClean="0"/>
-              <a:t>23/04/2020</a:t>
+              <a:t>27/04/2020</a:t>
             </a:fld>
             <a:endParaRPr lang="en-IE"/>
           </a:p>
@@ -2080,7 +2086,7 @@
           <a:p>
             <a:fld id="{8F605EE6-647E-41E2-978E-F926EDC8EAD0}" type="datetimeFigureOut">
               <a:rPr lang="en-IE" smtClean="0"/>
-              <a:t>23/04/2020</a:t>
+              <a:t>27/04/2020</a:t>
             </a:fld>
             <a:endParaRPr lang="en-IE"/>
           </a:p>
@@ -2393,7 +2399,7 @@
           <a:p>
             <a:fld id="{8F605EE6-647E-41E2-978E-F926EDC8EAD0}" type="datetimeFigureOut">
               <a:rPr lang="en-IE" smtClean="0"/>
-              <a:t>23/04/2020</a:t>
+              <a:t>27/04/2020</a:t>
             </a:fld>
             <a:endParaRPr lang="en-IE"/>
           </a:p>
@@ -2682,7 +2688,7 @@
           <a:p>
             <a:fld id="{8F605EE6-647E-41E2-978E-F926EDC8EAD0}" type="datetimeFigureOut">
               <a:rPr lang="en-IE" smtClean="0"/>
-              <a:t>23/04/2020</a:t>
+              <a:t>27/04/2020</a:t>
             </a:fld>
             <a:endParaRPr lang="en-IE"/>
           </a:p>
@@ -2925,7 +2931,7 @@
           <a:p>
             <a:fld id="{8F605EE6-647E-41E2-978E-F926EDC8EAD0}" type="datetimeFigureOut">
               <a:rPr lang="en-IE" smtClean="0"/>
-              <a:t>23/04/2020</a:t>
+              <a:t>27/04/2020</a:t>
             </a:fld>
             <a:endParaRPr lang="en-IE"/>
           </a:p>
@@ -4828,6 +4834,834 @@
 </p:sld>
 </file>
 
+<file path=ppt/slides/slide2.xml><?xml version="1.0" encoding="utf-8"?>
+<p:sld xmlns:a="http://schemas.openxmlformats.org/drawingml/2006/main" xmlns:r="http://schemas.openxmlformats.org/officeDocument/2006/relationships" xmlns:p="http://schemas.openxmlformats.org/presentationml/2006/main">
+  <p:cSld>
+    <p:spTree>
+      <p:nvGrpSpPr>
+        <p:cNvPr id="1" name=""/>
+        <p:cNvGrpSpPr/>
+        <p:nvPr/>
+      </p:nvGrpSpPr>
+      <p:grpSpPr>
+        <a:xfrm>
+          <a:off x="0" y="0"/>
+          <a:ext cx="0" cy="0"/>
+          <a:chOff x="0" y="0"/>
+          <a:chExt cx="0" cy="0"/>
+        </a:xfrm>
+      </p:grpSpPr>
+      <p:sp>
+        <p:nvSpPr>
+          <p:cNvPr id="4" name="Rectangle: Beveled 3">
+            <a:extLst>
+              <a:ext uri="{FF2B5EF4-FFF2-40B4-BE49-F238E27FC236}">
+                <a16:creationId xmlns:a16="http://schemas.microsoft.com/office/drawing/2014/main" id="{4A010EA4-D5CC-4F2E-9854-2C34BD118C15}"/>
+              </a:ext>
+            </a:extLst>
+          </p:cNvPr>
+          <p:cNvSpPr/>
+          <p:nvPr/>
+        </p:nvSpPr>
+        <p:spPr>
+          <a:xfrm>
+            <a:off x="3937518" y="350285"/>
+            <a:ext cx="3542382" cy="893338"/>
+          </a:xfrm>
+          <a:prstGeom prst="bevel">
+            <a:avLst>
+              <a:gd name="adj" fmla="val 11250"/>
+            </a:avLst>
+          </a:prstGeom>
+          <a:solidFill>
+            <a:srgbClr val="002060"/>
+          </a:solidFill>
+          <a:ln>
+            <a:solidFill>
+              <a:schemeClr val="tx1"/>
+            </a:solidFill>
+          </a:ln>
+        </p:spPr>
+        <p:style>
+          <a:lnRef idx="2">
+            <a:schemeClr val="accent1">
+              <a:shade val="50000"/>
+            </a:schemeClr>
+          </a:lnRef>
+          <a:fillRef idx="1">
+            <a:schemeClr val="accent1"/>
+          </a:fillRef>
+          <a:effectRef idx="0">
+            <a:schemeClr val="accent1"/>
+          </a:effectRef>
+          <a:fontRef idx="minor">
+            <a:schemeClr val="lt1"/>
+          </a:fontRef>
+        </p:style>
+        <p:txBody>
+          <a:bodyPr rtlCol="0" anchor="ctr"/>
+          <a:lstStyle/>
+          <a:p>
+            <a:pPr algn="ctr"/>
+            <a:r>
+              <a:rPr lang="en-IE" sz="3200" dirty="0"/>
+              <a:t>Handshake Server</a:t>
+            </a:r>
+          </a:p>
+        </p:txBody>
+      </p:sp>
+      <p:sp>
+        <p:nvSpPr>
+          <p:cNvPr id="5" name="Flowchart: Multidocument 4">
+            <a:extLst>
+              <a:ext uri="{FF2B5EF4-FFF2-40B4-BE49-F238E27FC236}">
+                <a16:creationId xmlns:a16="http://schemas.microsoft.com/office/drawing/2014/main" id="{B4375E86-DD7B-4CF3-9461-402B40A1309C}"/>
+              </a:ext>
+            </a:extLst>
+          </p:cNvPr>
+          <p:cNvSpPr/>
+          <p:nvPr/>
+        </p:nvSpPr>
+        <p:spPr>
+          <a:xfrm>
+            <a:off x="7479900" y="2218889"/>
+            <a:ext cx="1954635" cy="834703"/>
+          </a:xfrm>
+          <a:prstGeom prst="flowChartMultidocument">
+            <a:avLst/>
+          </a:prstGeom>
+        </p:spPr>
+        <p:style>
+          <a:lnRef idx="2">
+            <a:schemeClr val="accent1">
+              <a:shade val="50000"/>
+            </a:schemeClr>
+          </a:lnRef>
+          <a:fillRef idx="1">
+            <a:schemeClr val="accent1"/>
+          </a:fillRef>
+          <a:effectRef idx="0">
+            <a:schemeClr val="accent1"/>
+          </a:effectRef>
+          <a:fontRef idx="minor">
+            <a:schemeClr val="lt1"/>
+          </a:fontRef>
+        </p:style>
+        <p:txBody>
+          <a:bodyPr rtlCol="0" anchor="ctr"/>
+          <a:lstStyle/>
+          <a:p>
+            <a:pPr algn="ctr"/>
+            <a:r>
+              <a:rPr lang="en-IE" sz="3200" dirty="0"/>
+              <a:t>Clients</a:t>
+            </a:r>
+          </a:p>
+        </p:txBody>
+      </p:sp>
+      <p:sp>
+        <p:nvSpPr>
+          <p:cNvPr id="6" name="Flowchart: Predefined Process 5">
+            <a:extLst>
+              <a:ext uri="{FF2B5EF4-FFF2-40B4-BE49-F238E27FC236}">
+                <a16:creationId xmlns:a16="http://schemas.microsoft.com/office/drawing/2014/main" id="{3E1E9C20-FB98-4236-BEA1-CAC9CF40A8C2}"/>
+              </a:ext>
+            </a:extLst>
+          </p:cNvPr>
+          <p:cNvSpPr/>
+          <p:nvPr/>
+        </p:nvSpPr>
+        <p:spPr>
+          <a:xfrm>
+            <a:off x="2122415" y="2218889"/>
+            <a:ext cx="1954635" cy="834703"/>
+          </a:xfrm>
+          <a:prstGeom prst="flowChartPredefinedProcess">
+            <a:avLst/>
+          </a:prstGeom>
+        </p:spPr>
+        <p:style>
+          <a:lnRef idx="2">
+            <a:schemeClr val="accent1">
+              <a:shade val="50000"/>
+            </a:schemeClr>
+          </a:lnRef>
+          <a:fillRef idx="1">
+            <a:schemeClr val="accent1"/>
+          </a:fillRef>
+          <a:effectRef idx="0">
+            <a:schemeClr val="accent1"/>
+          </a:effectRef>
+          <a:fontRef idx="minor">
+            <a:schemeClr val="lt1"/>
+          </a:fontRef>
+        </p:style>
+        <p:txBody>
+          <a:bodyPr rtlCol="0" anchor="ctr"/>
+          <a:lstStyle/>
+          <a:p>
+            <a:pPr algn="ctr"/>
+            <a:r>
+              <a:rPr lang="en-IE" sz="3200" dirty="0"/>
+              <a:t>Host</a:t>
+            </a:r>
+            <a:endParaRPr lang="en-IE" dirty="0"/>
+          </a:p>
+        </p:txBody>
+      </p:sp>
+      <p:cxnSp>
+        <p:nvCxnSpPr>
+          <p:cNvPr id="8" name="Connector: Elbow 7">
+            <a:extLst>
+              <a:ext uri="{FF2B5EF4-FFF2-40B4-BE49-F238E27FC236}">
+                <a16:creationId xmlns:a16="http://schemas.microsoft.com/office/drawing/2014/main" id="{1B70E976-BE4D-476F-BB6C-AE282AF116B2}"/>
+              </a:ext>
+            </a:extLst>
+          </p:cNvPr>
+          <p:cNvCxnSpPr>
+            <a:cxnSpLocks/>
+            <a:stCxn id="5" idx="0"/>
+            <a:endCxn id="4" idx="0"/>
+          </p:cNvCxnSpPr>
+          <p:nvPr/>
+        </p:nvCxnSpPr>
+        <p:spPr>
+          <a:xfrm rot="16200000" flipV="1">
+            <a:off x="7324828" y="952027"/>
+            <a:ext cx="1421935" cy="1111789"/>
+          </a:xfrm>
+          <a:prstGeom prst="bentConnector2">
+            <a:avLst/>
+          </a:prstGeom>
+          <a:ln w="38100" cmpd="dbl">
+            <a:solidFill>
+              <a:schemeClr val="tx1"/>
+            </a:solidFill>
+            <a:prstDash val="dash"/>
+            <a:tailEnd type="triangle"/>
+          </a:ln>
+        </p:spPr>
+        <p:style>
+          <a:lnRef idx="1">
+            <a:schemeClr val="accent1"/>
+          </a:lnRef>
+          <a:fillRef idx="0">
+            <a:schemeClr val="accent1"/>
+          </a:fillRef>
+          <a:effectRef idx="0">
+            <a:schemeClr val="accent1"/>
+          </a:effectRef>
+          <a:fontRef idx="minor">
+            <a:schemeClr val="tx1"/>
+          </a:fontRef>
+        </p:style>
+      </p:cxnSp>
+      <p:cxnSp>
+        <p:nvCxnSpPr>
+          <p:cNvPr id="14" name="Connector: Elbow 13">
+            <a:extLst>
+              <a:ext uri="{FF2B5EF4-FFF2-40B4-BE49-F238E27FC236}">
+                <a16:creationId xmlns:a16="http://schemas.microsoft.com/office/drawing/2014/main" id="{F2195F14-EF35-4142-BBE8-4C607627D748}"/>
+              </a:ext>
+            </a:extLst>
+          </p:cNvPr>
+          <p:cNvCxnSpPr>
+            <a:cxnSpLocks/>
+            <a:stCxn id="6" idx="0"/>
+            <a:endCxn id="4" idx="4"/>
+          </p:cNvCxnSpPr>
+          <p:nvPr/>
+        </p:nvCxnSpPr>
+        <p:spPr>
+          <a:xfrm rot="5400000" flipH="1" flipV="1">
+            <a:off x="2807658" y="1089030"/>
+            <a:ext cx="1421935" cy="837785"/>
+          </a:xfrm>
+          <a:prstGeom prst="bentConnector2">
+            <a:avLst/>
+          </a:prstGeom>
+          <a:ln w="38100" cmpd="dbl">
+            <a:solidFill>
+              <a:schemeClr val="tx1"/>
+            </a:solidFill>
+            <a:prstDash val="dash"/>
+            <a:tailEnd type="triangle"/>
+          </a:ln>
+        </p:spPr>
+        <p:style>
+          <a:lnRef idx="1">
+            <a:schemeClr val="accent1"/>
+          </a:lnRef>
+          <a:fillRef idx="0">
+            <a:schemeClr val="accent1"/>
+          </a:fillRef>
+          <a:effectRef idx="0">
+            <a:schemeClr val="accent1"/>
+          </a:effectRef>
+          <a:fontRef idx="minor">
+            <a:schemeClr val="tx1"/>
+          </a:fontRef>
+        </p:style>
+      </p:cxnSp>
+      <p:cxnSp>
+        <p:nvCxnSpPr>
+          <p:cNvPr id="19" name="Connector: Elbow 18">
+            <a:extLst>
+              <a:ext uri="{FF2B5EF4-FFF2-40B4-BE49-F238E27FC236}">
+                <a16:creationId xmlns:a16="http://schemas.microsoft.com/office/drawing/2014/main" id="{CB0F0434-29E9-42BE-B199-6F56ED358ED5}"/>
+              </a:ext>
+            </a:extLst>
+          </p:cNvPr>
+          <p:cNvCxnSpPr>
+            <a:cxnSpLocks/>
+            <a:stCxn id="4" idx="2"/>
+            <a:endCxn id="6" idx="3"/>
+          </p:cNvCxnSpPr>
+          <p:nvPr/>
+        </p:nvCxnSpPr>
+        <p:spPr>
+          <a:xfrm rot="5400000">
+            <a:off x="4196571" y="1124103"/>
+            <a:ext cx="1392618" cy="1631659"/>
+          </a:xfrm>
+          <a:prstGeom prst="bentConnector2">
+            <a:avLst/>
+          </a:prstGeom>
+          <a:ln w="38100" cmpd="dbl">
+            <a:solidFill>
+              <a:schemeClr val="tx1"/>
+            </a:solidFill>
+            <a:prstDash val="dash"/>
+            <a:tailEnd type="triangle"/>
+          </a:ln>
+        </p:spPr>
+        <p:style>
+          <a:lnRef idx="1">
+            <a:schemeClr val="accent1"/>
+          </a:lnRef>
+          <a:fillRef idx="0">
+            <a:schemeClr val="accent1"/>
+          </a:fillRef>
+          <a:effectRef idx="0">
+            <a:schemeClr val="accent1"/>
+          </a:effectRef>
+          <a:fontRef idx="minor">
+            <a:schemeClr val="tx1"/>
+          </a:fontRef>
+        </p:style>
+      </p:cxnSp>
+      <p:cxnSp>
+        <p:nvCxnSpPr>
+          <p:cNvPr id="22" name="Connector: Elbow 21">
+            <a:extLst>
+              <a:ext uri="{FF2B5EF4-FFF2-40B4-BE49-F238E27FC236}">
+                <a16:creationId xmlns:a16="http://schemas.microsoft.com/office/drawing/2014/main" id="{32381096-D1D4-4118-827B-DD00AB8A9223}"/>
+              </a:ext>
+            </a:extLst>
+          </p:cNvPr>
+          <p:cNvCxnSpPr>
+            <a:cxnSpLocks/>
+            <a:stCxn id="4" idx="2"/>
+            <a:endCxn id="5" idx="1"/>
+          </p:cNvCxnSpPr>
+          <p:nvPr/>
+        </p:nvCxnSpPr>
+        <p:spPr>
+          <a:xfrm rot="16200000" flipH="1">
+            <a:off x="5897995" y="1054336"/>
+            <a:ext cx="1392618" cy="1771191"/>
+          </a:xfrm>
+          <a:prstGeom prst="bentConnector2">
+            <a:avLst/>
+          </a:prstGeom>
+          <a:ln w="38100" cmpd="dbl">
+            <a:solidFill>
+              <a:schemeClr val="tx1"/>
+            </a:solidFill>
+            <a:prstDash val="dash"/>
+            <a:tailEnd type="triangle"/>
+          </a:ln>
+        </p:spPr>
+        <p:style>
+          <a:lnRef idx="1">
+            <a:schemeClr val="accent1"/>
+          </a:lnRef>
+          <a:fillRef idx="0">
+            <a:schemeClr val="accent1"/>
+          </a:fillRef>
+          <a:effectRef idx="0">
+            <a:schemeClr val="accent1"/>
+          </a:effectRef>
+          <a:fontRef idx="minor">
+            <a:schemeClr val="tx1"/>
+          </a:fontRef>
+        </p:style>
+      </p:cxnSp>
+      <p:sp>
+        <p:nvSpPr>
+          <p:cNvPr id="42" name="TextBox 41">
+            <a:extLst>
+              <a:ext uri="{FF2B5EF4-FFF2-40B4-BE49-F238E27FC236}">
+                <a16:creationId xmlns:a16="http://schemas.microsoft.com/office/drawing/2014/main" id="{D3AABED4-39FB-48A9-B42F-544162F1191E}"/>
+              </a:ext>
+            </a:extLst>
+          </p:cNvPr>
+          <p:cNvSpPr txBox="1"/>
+          <p:nvPr/>
+        </p:nvSpPr>
+        <p:spPr>
+          <a:xfrm>
+            <a:off x="3621456" y="394886"/>
+            <a:ext cx="316061" cy="376526"/>
+          </a:xfrm>
+          <a:prstGeom prst="rect">
+            <a:avLst/>
+          </a:prstGeom>
+          <a:noFill/>
+        </p:spPr>
+        <p:txBody>
+          <a:bodyPr wrap="square" rtlCol="0">
+            <a:spAutoFit/>
+          </a:bodyPr>
+          <a:lstStyle/>
+          <a:p>
+            <a:r>
+              <a:rPr lang="en-IE" dirty="0"/>
+              <a:t>1</a:t>
+            </a:r>
+          </a:p>
+        </p:txBody>
+      </p:sp>
+      <p:sp>
+        <p:nvSpPr>
+          <p:cNvPr id="43" name="TextBox 42">
+            <a:extLst>
+              <a:ext uri="{FF2B5EF4-FFF2-40B4-BE49-F238E27FC236}">
+                <a16:creationId xmlns:a16="http://schemas.microsoft.com/office/drawing/2014/main" id="{353A5C9D-8C6E-403E-9FB4-84DE3223F3D5}"/>
+              </a:ext>
+            </a:extLst>
+          </p:cNvPr>
+          <p:cNvSpPr txBox="1"/>
+          <p:nvPr/>
+        </p:nvSpPr>
+        <p:spPr>
+          <a:xfrm>
+            <a:off x="7479900" y="367909"/>
+            <a:ext cx="373380" cy="369332"/>
+          </a:xfrm>
+          <a:prstGeom prst="rect">
+            <a:avLst/>
+          </a:prstGeom>
+          <a:noFill/>
+        </p:spPr>
+        <p:txBody>
+          <a:bodyPr wrap="square" rtlCol="0">
+            <a:spAutoFit/>
+          </a:bodyPr>
+          <a:lstStyle/>
+          <a:p>
+            <a:r>
+              <a:rPr lang="en-IE" dirty="0"/>
+              <a:t>2</a:t>
+            </a:r>
+          </a:p>
+        </p:txBody>
+      </p:sp>
+      <p:sp>
+        <p:nvSpPr>
+          <p:cNvPr id="44" name="TextBox 43">
+            <a:extLst>
+              <a:ext uri="{FF2B5EF4-FFF2-40B4-BE49-F238E27FC236}">
+                <a16:creationId xmlns:a16="http://schemas.microsoft.com/office/drawing/2014/main" id="{7130CB6D-6BA8-4AA1-9073-A942D42D52FD}"/>
+              </a:ext>
+            </a:extLst>
+          </p:cNvPr>
+          <p:cNvSpPr txBox="1"/>
+          <p:nvPr/>
+        </p:nvSpPr>
+        <p:spPr>
+          <a:xfrm>
+            <a:off x="4077050" y="2660251"/>
+            <a:ext cx="299031" cy="369332"/>
+          </a:xfrm>
+          <a:prstGeom prst="rect">
+            <a:avLst/>
+          </a:prstGeom>
+          <a:noFill/>
+        </p:spPr>
+        <p:txBody>
+          <a:bodyPr wrap="square" rtlCol="0">
+            <a:spAutoFit/>
+          </a:bodyPr>
+          <a:lstStyle/>
+          <a:p>
+            <a:r>
+              <a:rPr lang="en-IE" dirty="0"/>
+              <a:t>3</a:t>
+            </a:r>
+          </a:p>
+        </p:txBody>
+      </p:sp>
+      <p:sp>
+        <p:nvSpPr>
+          <p:cNvPr id="45" name="TextBox 44">
+            <a:extLst>
+              <a:ext uri="{FF2B5EF4-FFF2-40B4-BE49-F238E27FC236}">
+                <a16:creationId xmlns:a16="http://schemas.microsoft.com/office/drawing/2014/main" id="{4D1BFB94-2263-4ADC-87BA-5F6736F8D686}"/>
+              </a:ext>
+            </a:extLst>
+          </p:cNvPr>
+          <p:cNvSpPr txBox="1"/>
+          <p:nvPr/>
+        </p:nvSpPr>
+        <p:spPr>
+          <a:xfrm>
+            <a:off x="7180869" y="2660250"/>
+            <a:ext cx="299031" cy="369332"/>
+          </a:xfrm>
+          <a:prstGeom prst="rect">
+            <a:avLst/>
+          </a:prstGeom>
+          <a:noFill/>
+        </p:spPr>
+        <p:txBody>
+          <a:bodyPr wrap="square" rtlCol="0">
+            <a:spAutoFit/>
+          </a:bodyPr>
+          <a:lstStyle/>
+          <a:p>
+            <a:r>
+              <a:rPr lang="en-IE" dirty="0"/>
+              <a:t>4</a:t>
+            </a:r>
+          </a:p>
+        </p:txBody>
+      </p:sp>
+      <p:cxnSp>
+        <p:nvCxnSpPr>
+          <p:cNvPr id="53" name="Straight Arrow Connector 52">
+            <a:extLst>
+              <a:ext uri="{FF2B5EF4-FFF2-40B4-BE49-F238E27FC236}">
+                <a16:creationId xmlns:a16="http://schemas.microsoft.com/office/drawing/2014/main" id="{5DC35F12-362A-4F01-B2C5-6B0493B12D93}"/>
+              </a:ext>
+            </a:extLst>
+          </p:cNvPr>
+          <p:cNvCxnSpPr>
+            <a:stCxn id="6" idx="3"/>
+            <a:endCxn id="5" idx="1"/>
+          </p:cNvCxnSpPr>
+          <p:nvPr/>
+        </p:nvCxnSpPr>
+        <p:spPr>
+          <a:xfrm>
+            <a:off x="4077050" y="2636241"/>
+            <a:ext cx="3402850" cy="0"/>
+          </a:xfrm>
+          <a:prstGeom prst="straightConnector1">
+            <a:avLst/>
+          </a:prstGeom>
+          <a:ln w="53975">
+            <a:solidFill>
+              <a:schemeClr val="tx1"/>
+            </a:solidFill>
+            <a:headEnd type="triangle"/>
+            <a:tailEnd type="triangle"/>
+          </a:ln>
+        </p:spPr>
+        <p:style>
+          <a:lnRef idx="1">
+            <a:schemeClr val="accent1"/>
+          </a:lnRef>
+          <a:fillRef idx="0">
+            <a:schemeClr val="accent1"/>
+          </a:fillRef>
+          <a:effectRef idx="0">
+            <a:schemeClr val="accent1"/>
+          </a:effectRef>
+          <a:fontRef idx="minor">
+            <a:schemeClr val="tx1"/>
+          </a:fontRef>
+        </p:style>
+      </p:cxnSp>
+      <p:grpSp>
+        <p:nvGrpSpPr>
+          <p:cNvPr id="57" name="Group 56">
+            <a:extLst>
+              <a:ext uri="{FF2B5EF4-FFF2-40B4-BE49-F238E27FC236}">
+                <a16:creationId xmlns:a16="http://schemas.microsoft.com/office/drawing/2014/main" id="{BF337354-FFF4-4FFD-B349-B8E35F879905}"/>
+              </a:ext>
+            </a:extLst>
+          </p:cNvPr>
+          <p:cNvGrpSpPr/>
+          <p:nvPr/>
+        </p:nvGrpSpPr>
+        <p:grpSpPr>
+          <a:xfrm>
+            <a:off x="5187229" y="1261748"/>
+            <a:ext cx="1013927" cy="1013926"/>
+            <a:chOff x="5187229" y="1261748"/>
+            <a:chExt cx="1013927" cy="1013926"/>
+          </a:xfrm>
+        </p:grpSpPr>
+        <p:grpSp>
+          <p:nvGrpSpPr>
+            <p:cNvPr id="41" name="Group 40">
+              <a:extLst>
+                <a:ext uri="{FF2B5EF4-FFF2-40B4-BE49-F238E27FC236}">
+                  <a16:creationId xmlns:a16="http://schemas.microsoft.com/office/drawing/2014/main" id="{DAA45032-0983-4964-9EE7-884B7531281D}"/>
+                </a:ext>
+              </a:extLst>
+            </p:cNvPr>
+            <p:cNvGrpSpPr/>
+            <p:nvPr/>
+          </p:nvGrpSpPr>
+          <p:grpSpPr>
+            <a:xfrm>
+              <a:off x="5187229" y="1457429"/>
+              <a:ext cx="1013927" cy="635266"/>
+              <a:chOff x="5212629" y="1457429"/>
+              <a:chExt cx="1013927" cy="635266"/>
+            </a:xfrm>
+          </p:grpSpPr>
+          <p:cxnSp>
+            <p:nvCxnSpPr>
+              <p:cNvPr id="39" name="Straight Connector 38">
+                <a:extLst>
+                  <a:ext uri="{FF2B5EF4-FFF2-40B4-BE49-F238E27FC236}">
+                    <a16:creationId xmlns:a16="http://schemas.microsoft.com/office/drawing/2014/main" id="{670B091B-DFC9-46F4-8714-E020EF18F9EF}"/>
+                  </a:ext>
+                </a:extLst>
+              </p:cNvPr>
+              <p:cNvCxnSpPr/>
+              <p:nvPr/>
+            </p:nvCxnSpPr>
+            <p:spPr>
+              <a:xfrm flipV="1">
+                <a:off x="5212629" y="1457429"/>
+                <a:ext cx="992155" cy="604693"/>
+              </a:xfrm>
+              <a:prstGeom prst="line">
+                <a:avLst/>
+              </a:prstGeom>
+              <a:ln w="15875">
+                <a:solidFill>
+                  <a:schemeClr val="tx1"/>
+                </a:solidFill>
+                <a:prstDash val="sysDash"/>
+              </a:ln>
+            </p:spPr>
+            <p:style>
+              <a:lnRef idx="1">
+                <a:schemeClr val="accent1"/>
+              </a:lnRef>
+              <a:fillRef idx="0">
+                <a:schemeClr val="accent1"/>
+              </a:fillRef>
+              <a:effectRef idx="0">
+                <a:schemeClr val="accent1"/>
+              </a:effectRef>
+              <a:fontRef idx="minor">
+                <a:schemeClr val="tx1"/>
+              </a:fontRef>
+            </p:style>
+          </p:cxnSp>
+          <p:cxnSp>
+            <p:nvCxnSpPr>
+              <p:cNvPr id="40" name="Straight Connector 39">
+                <a:extLst>
+                  <a:ext uri="{FF2B5EF4-FFF2-40B4-BE49-F238E27FC236}">
+                    <a16:creationId xmlns:a16="http://schemas.microsoft.com/office/drawing/2014/main" id="{60C9CEDD-329B-4EE6-94F9-66667B9B8DC5}"/>
+                  </a:ext>
+                </a:extLst>
+              </p:cNvPr>
+              <p:cNvCxnSpPr/>
+              <p:nvPr/>
+            </p:nvCxnSpPr>
+            <p:spPr>
+              <a:xfrm flipV="1">
+                <a:off x="5234401" y="1488002"/>
+                <a:ext cx="992155" cy="604693"/>
+              </a:xfrm>
+              <a:prstGeom prst="line">
+                <a:avLst/>
+              </a:prstGeom>
+              <a:ln w="15875">
+                <a:solidFill>
+                  <a:schemeClr val="tx1"/>
+                </a:solidFill>
+                <a:prstDash val="sysDash"/>
+              </a:ln>
+            </p:spPr>
+            <p:style>
+              <a:lnRef idx="1">
+                <a:schemeClr val="accent1"/>
+              </a:lnRef>
+              <a:fillRef idx="0">
+                <a:schemeClr val="accent1"/>
+              </a:fillRef>
+              <a:effectRef idx="0">
+                <a:schemeClr val="accent1"/>
+              </a:effectRef>
+              <a:fontRef idx="minor">
+                <a:schemeClr val="tx1"/>
+              </a:fontRef>
+            </p:style>
+          </p:cxnSp>
+        </p:grpSp>
+        <p:grpSp>
+          <p:nvGrpSpPr>
+            <p:cNvPr id="54" name="Group 53">
+              <a:extLst>
+                <a:ext uri="{FF2B5EF4-FFF2-40B4-BE49-F238E27FC236}">
+                  <a16:creationId xmlns:a16="http://schemas.microsoft.com/office/drawing/2014/main" id="{0028F16F-7B6E-434A-BF44-1D2C16CA6A55}"/>
+                </a:ext>
+              </a:extLst>
+            </p:cNvPr>
+            <p:cNvGrpSpPr/>
+            <p:nvPr/>
+          </p:nvGrpSpPr>
+          <p:grpSpPr>
+            <a:xfrm rot="3600000">
+              <a:off x="5199930" y="1451078"/>
+              <a:ext cx="1013926" cy="635266"/>
+              <a:chOff x="5212629" y="1457429"/>
+              <a:chExt cx="1013926" cy="635266"/>
+            </a:xfrm>
+          </p:grpSpPr>
+          <p:cxnSp>
+            <p:nvCxnSpPr>
+              <p:cNvPr id="55" name="Straight Connector 54">
+                <a:extLst>
+                  <a:ext uri="{FF2B5EF4-FFF2-40B4-BE49-F238E27FC236}">
+                    <a16:creationId xmlns:a16="http://schemas.microsoft.com/office/drawing/2014/main" id="{71C0336D-4FCE-4E37-98B2-F2D6F1D907E9}"/>
+                  </a:ext>
+                </a:extLst>
+              </p:cNvPr>
+              <p:cNvCxnSpPr/>
+              <p:nvPr/>
+            </p:nvCxnSpPr>
+            <p:spPr>
+              <a:xfrm flipV="1">
+                <a:off x="5212629" y="1457429"/>
+                <a:ext cx="992155" cy="604693"/>
+              </a:xfrm>
+              <a:prstGeom prst="line">
+                <a:avLst/>
+              </a:prstGeom>
+              <a:ln w="15875">
+                <a:solidFill>
+                  <a:schemeClr val="tx1"/>
+                </a:solidFill>
+                <a:prstDash val="sysDash"/>
+              </a:ln>
+            </p:spPr>
+            <p:style>
+              <a:lnRef idx="1">
+                <a:schemeClr val="accent1"/>
+              </a:lnRef>
+              <a:fillRef idx="0">
+                <a:schemeClr val="accent1"/>
+              </a:fillRef>
+              <a:effectRef idx="0">
+                <a:schemeClr val="accent1"/>
+              </a:effectRef>
+              <a:fontRef idx="minor">
+                <a:schemeClr val="tx1"/>
+              </a:fontRef>
+            </p:style>
+          </p:cxnSp>
+          <p:cxnSp>
+            <p:nvCxnSpPr>
+              <p:cNvPr id="56" name="Straight Connector 55">
+                <a:extLst>
+                  <a:ext uri="{FF2B5EF4-FFF2-40B4-BE49-F238E27FC236}">
+                    <a16:creationId xmlns:a16="http://schemas.microsoft.com/office/drawing/2014/main" id="{65FF743D-CB9D-4C01-88CD-978EDE1B6267}"/>
+                  </a:ext>
+                </a:extLst>
+              </p:cNvPr>
+              <p:cNvCxnSpPr/>
+              <p:nvPr/>
+            </p:nvCxnSpPr>
+            <p:spPr>
+              <a:xfrm flipV="1">
+                <a:off x="5234400" y="1488002"/>
+                <a:ext cx="992155" cy="604693"/>
+              </a:xfrm>
+              <a:prstGeom prst="line">
+                <a:avLst/>
+              </a:prstGeom>
+              <a:ln w="15875">
+                <a:solidFill>
+                  <a:schemeClr val="tx1"/>
+                </a:solidFill>
+                <a:prstDash val="sysDash"/>
+              </a:ln>
+            </p:spPr>
+            <p:style>
+              <a:lnRef idx="1">
+                <a:schemeClr val="accent1"/>
+              </a:lnRef>
+              <a:fillRef idx="0">
+                <a:schemeClr val="accent1"/>
+              </a:fillRef>
+              <a:effectRef idx="0">
+                <a:schemeClr val="accent1"/>
+              </a:effectRef>
+              <a:fontRef idx="minor">
+                <a:schemeClr val="tx1"/>
+              </a:fontRef>
+            </p:style>
+          </p:cxnSp>
+        </p:grpSp>
+      </p:grpSp>
+      <p:sp>
+        <p:nvSpPr>
+          <p:cNvPr id="58" name="TextBox 57">
+            <a:extLst>
+              <a:ext uri="{FF2B5EF4-FFF2-40B4-BE49-F238E27FC236}">
+                <a16:creationId xmlns:a16="http://schemas.microsoft.com/office/drawing/2014/main" id="{A335FA4D-81F8-41D9-B0E6-6DA0887D302B}"/>
+              </a:ext>
+            </a:extLst>
+          </p:cNvPr>
+          <p:cNvSpPr txBox="1"/>
+          <p:nvPr/>
+        </p:nvSpPr>
+        <p:spPr>
+          <a:xfrm>
+            <a:off x="5891985" y="1572075"/>
+            <a:ext cx="301686" cy="369332"/>
+          </a:xfrm>
+          <a:prstGeom prst="rect">
+            <a:avLst/>
+          </a:prstGeom>
+          <a:noFill/>
+        </p:spPr>
+        <p:txBody>
+          <a:bodyPr wrap="none" rtlCol="0">
+            <a:spAutoFit/>
+          </a:bodyPr>
+          <a:lstStyle/>
+          <a:p>
+            <a:r>
+              <a:rPr lang="en-IE" dirty="0"/>
+              <a:t>5</a:t>
+            </a:r>
+          </a:p>
+        </p:txBody>
+      </p:sp>
+    </p:spTree>
+    <p:extLst>
+      <p:ext uri="{BB962C8B-B14F-4D97-AF65-F5344CB8AC3E}">
+        <p14:creationId xmlns:p14="http://schemas.microsoft.com/office/powerpoint/2010/main" val="1243376452"/>
+      </p:ext>
+    </p:extLst>
+  </p:cSld>
+  <p:clrMapOvr>
+    <a:masterClrMapping/>
+  </p:clrMapOvr>
+</p:sld>
+</file>
+
 <file path=ppt/theme/theme1.xml><?xml version="1.0" encoding="utf-8"?>
 <a:theme xmlns:a="http://schemas.openxmlformats.org/drawingml/2006/main" name="Office Theme">
   <a:themeElements>

</xml_diff>